<commit_message>
TeensyUSBAudio: update figures for blog
</commit_message>
<xml_diff>
--- a/2016-10-24 Teensy Audio USB/Figures for Blog/Figures.pptx
+++ b/2016-10-24 Teensy Audio USB/Figures for Blog/Figures.pptx
@@ -301,7 +301,7 @@
             <a:fld id="{1D8BD707-D9CF-40AE-B4C6-C98DA3205C09}" type="datetimeFigureOut">
               <a:rPr lang="en-US" smtClean="0"/>
               <a:pPr/>
-              <a:t>10/24/2016</a:t>
+              <a:t>10/25/2016</a:t>
             </a:fld>
             <a:endParaRPr lang="en-US"/>
           </a:p>
@@ -468,7 +468,7 @@
             <a:fld id="{1D8BD707-D9CF-40AE-B4C6-C98DA3205C09}" type="datetimeFigureOut">
               <a:rPr lang="en-US" smtClean="0"/>
               <a:pPr/>
-              <a:t>10/24/2016</a:t>
+              <a:t>10/25/2016</a:t>
             </a:fld>
             <a:endParaRPr lang="en-US"/>
           </a:p>
@@ -645,7 +645,7 @@
             <a:fld id="{1D8BD707-D9CF-40AE-B4C6-C98DA3205C09}" type="datetimeFigureOut">
               <a:rPr lang="en-US" smtClean="0"/>
               <a:pPr/>
-              <a:t>10/24/2016</a:t>
+              <a:t>10/25/2016</a:t>
             </a:fld>
             <a:endParaRPr lang="en-US"/>
           </a:p>
@@ -812,7 +812,7 @@
             <a:fld id="{1D8BD707-D9CF-40AE-B4C6-C98DA3205C09}" type="datetimeFigureOut">
               <a:rPr lang="en-US" smtClean="0"/>
               <a:pPr/>
-              <a:t>10/24/2016</a:t>
+              <a:t>10/25/2016</a:t>
             </a:fld>
             <a:endParaRPr lang="en-US"/>
           </a:p>
@@ -1055,7 +1055,7 @@
             <a:fld id="{1D8BD707-D9CF-40AE-B4C6-C98DA3205C09}" type="datetimeFigureOut">
               <a:rPr lang="en-US" smtClean="0"/>
               <a:pPr/>
-              <a:t>10/24/2016</a:t>
+              <a:t>10/25/2016</a:t>
             </a:fld>
             <a:endParaRPr lang="en-US"/>
           </a:p>
@@ -1340,7 +1340,7 @@
             <a:fld id="{1D8BD707-D9CF-40AE-B4C6-C98DA3205C09}" type="datetimeFigureOut">
               <a:rPr lang="en-US" smtClean="0"/>
               <a:pPr/>
-              <a:t>10/24/2016</a:t>
+              <a:t>10/25/2016</a:t>
             </a:fld>
             <a:endParaRPr lang="en-US"/>
           </a:p>
@@ -1759,7 +1759,7 @@
             <a:fld id="{1D8BD707-D9CF-40AE-B4C6-C98DA3205C09}" type="datetimeFigureOut">
               <a:rPr lang="en-US" smtClean="0"/>
               <a:pPr/>
-              <a:t>10/24/2016</a:t>
+              <a:t>10/25/2016</a:t>
             </a:fld>
             <a:endParaRPr lang="en-US"/>
           </a:p>
@@ -1874,7 +1874,7 @@
             <a:fld id="{1D8BD707-D9CF-40AE-B4C6-C98DA3205C09}" type="datetimeFigureOut">
               <a:rPr lang="en-US" smtClean="0"/>
               <a:pPr/>
-              <a:t>10/24/2016</a:t>
+              <a:t>10/25/2016</a:t>
             </a:fld>
             <a:endParaRPr lang="en-US"/>
           </a:p>
@@ -1966,7 +1966,7 @@
             <a:fld id="{1D8BD707-D9CF-40AE-B4C6-C98DA3205C09}" type="datetimeFigureOut">
               <a:rPr lang="en-US" smtClean="0"/>
               <a:pPr/>
-              <a:t>10/24/2016</a:t>
+              <a:t>10/25/2016</a:t>
             </a:fld>
             <a:endParaRPr lang="en-US"/>
           </a:p>
@@ -2240,7 +2240,7 @@
             <a:fld id="{1D8BD707-D9CF-40AE-B4C6-C98DA3205C09}" type="datetimeFigureOut">
               <a:rPr lang="en-US" smtClean="0"/>
               <a:pPr/>
-              <a:t>10/24/2016</a:t>
+              <a:t>10/25/2016</a:t>
             </a:fld>
             <a:endParaRPr lang="en-US"/>
           </a:p>
@@ -2490,7 +2490,7 @@
             <a:fld id="{1D8BD707-D9CF-40AE-B4C6-C98DA3205C09}" type="datetimeFigureOut">
               <a:rPr lang="en-US" smtClean="0"/>
               <a:pPr/>
-              <a:t>10/24/2016</a:t>
+              <a:t>10/25/2016</a:t>
             </a:fld>
             <a:endParaRPr lang="en-US"/>
           </a:p>
@@ -2700,7 +2700,7 @@
             <a:fld id="{1D8BD707-D9CF-40AE-B4C6-C98DA3205C09}" type="datetimeFigureOut">
               <a:rPr lang="en-US" smtClean="0"/>
               <a:pPr/>
-              <a:t>10/24/2016</a:t>
+              <a:t>10/25/2016</a:t>
             </a:fld>
             <a:endParaRPr lang="en-US"/>
           </a:p>
@@ -4142,15 +4142,7 @@
                     <a:schemeClr val="tx1"/>
                   </a:solidFill>
                 </a:rPr>
-                <a:t>Change to </a:t>
-              </a:r>
-              <a:r>
-                <a:rPr lang="en-US" sz="1200" dirty="0" smtClean="0">
-                  <a:solidFill>
-                    <a:schemeClr val="tx1"/>
-                  </a:solidFill>
-                </a:rPr>
-                <a:t>MME</a:t>
+                <a:t>Change to MME</a:t>
               </a:r>
               <a:endParaRPr lang="en-US" sz="1200" dirty="0">
                 <a:solidFill>
@@ -4276,15 +4268,7 @@
                     <a:schemeClr val="tx1"/>
                   </a:solidFill>
                 </a:rPr>
-                <a:t>Change to </a:t>
-              </a:r>
-              <a:r>
-                <a:rPr lang="en-US" sz="1200" dirty="0" smtClean="0">
-                  <a:solidFill>
-                    <a:schemeClr val="tx1"/>
-                  </a:solidFill>
-                </a:rPr>
-                <a:t>44100</a:t>
+                <a:t>Change to 44100</a:t>
               </a:r>
               <a:endParaRPr lang="en-US" sz="1200" dirty="0">
                 <a:solidFill>
@@ -6431,11 +6415,7 @@
               <a:pPr algn="ctr"/>
               <a:r>
                 <a:rPr lang="en-US" b="1" dirty="0" smtClean="0"/>
-                <a:t>Add </a:t>
-              </a:r>
-              <a:r>
-                <a:rPr lang="en-US" b="1" dirty="0" smtClean="0"/>
-                <a:t>This</a:t>
+                <a:t>Add This</a:t>
               </a:r>
             </a:p>
             <a:p>
@@ -7046,15 +7026,7 @@
                     <a:schemeClr val="tx1"/>
                   </a:solidFill>
                 </a:rPr>
-                <a:t>Change to </a:t>
-              </a:r>
-              <a:r>
-                <a:rPr lang="en-US" sz="1200" dirty="0" smtClean="0">
-                  <a:solidFill>
-                    <a:schemeClr val="tx1"/>
-                  </a:solidFill>
-                </a:rPr>
-                <a:t>Stereo</a:t>
+                <a:t>Change to Stereo</a:t>
               </a:r>
               <a:endParaRPr lang="en-US" sz="1200" dirty="0">
                 <a:solidFill>
@@ -7180,15 +7152,7 @@
                     <a:schemeClr val="tx1"/>
                   </a:solidFill>
                 </a:rPr>
-                <a:t>Change to </a:t>
-              </a:r>
-              <a:r>
-                <a:rPr lang="en-US" sz="1200" dirty="0" smtClean="0">
-                  <a:solidFill>
-                    <a:schemeClr val="tx1"/>
-                  </a:solidFill>
-                </a:rPr>
-                <a:t>MME</a:t>
+                <a:t>Change to MME</a:t>
               </a:r>
               <a:endParaRPr lang="en-US" sz="1200" dirty="0">
                 <a:solidFill>
@@ -7251,15 +7215,7 @@
                     <a:schemeClr val="tx1"/>
                   </a:solidFill>
                 </a:rPr>
-                <a:t>Change to </a:t>
-              </a:r>
-              <a:r>
-                <a:rPr lang="en-US" sz="1200" dirty="0" smtClean="0">
-                  <a:solidFill>
-                    <a:schemeClr val="tx1"/>
-                  </a:solidFill>
-                </a:rPr>
-                <a:t>44100</a:t>
+                <a:t>Change to 44100</a:t>
               </a:r>
               <a:endParaRPr lang="en-US" sz="1200" dirty="0">
                 <a:solidFill>
@@ -7526,7 +7482,22 @@
                     </a:outerShdw>
                   </a:effectLst>
                 </a:rPr>
-                <a:t>From Teensy:</a:t>
+                <a:t>From Teensy</a:t>
+              </a:r>
+              <a:r>
+                <a:rPr lang="en-US" sz="2000" b="1" dirty="0" smtClean="0">
+                  <a:solidFill>
+                    <a:srgbClr val="FFFF00"/>
+                  </a:solidFill>
+                  <a:effectLst>
+                    <a:outerShdw blurRad="38100" dist="38100" dir="2700000" algn="tl">
+                      <a:srgbClr val="000000">
+                        <a:alpha val="43137"/>
+                      </a:srgbClr>
+                    </a:outerShdw>
+                  </a:effectLst>
+                </a:rPr>
+                <a:t>: Left</a:t>
               </a:r>
               <a:endParaRPr lang="en-US" sz="2000" b="1" dirty="0">
                 <a:solidFill>
@@ -7578,7 +7549,22 @@
                     </a:outerShdw>
                   </a:effectLst>
                 </a:rPr>
-                <a:t>From Teensy:</a:t>
+                <a:t>From Teensy</a:t>
+              </a:r>
+              <a:r>
+                <a:rPr lang="en-US" sz="2000" b="1" dirty="0" smtClean="0">
+                  <a:solidFill>
+                    <a:srgbClr val="FFFF00"/>
+                  </a:solidFill>
+                  <a:effectLst>
+                    <a:outerShdw blurRad="38100" dist="38100" dir="2700000" algn="tl">
+                      <a:srgbClr val="000000">
+                        <a:alpha val="43137"/>
+                      </a:srgbClr>
+                    </a:outerShdw>
+                  </a:effectLst>
+                </a:rPr>
+                <a:t>: Right</a:t>
               </a:r>
               <a:endParaRPr lang="en-US" sz="2000" b="1" dirty="0">
                 <a:solidFill>
@@ -7684,7 +7670,7 @@
                     </a:outerShdw>
                   </a:effectLst>
                 </a:rPr>
-                <a:t>Not Effected</a:t>
+                <a:t>Unaltered Signal</a:t>
               </a:r>
               <a:endParaRPr lang="en-US" sz="2000" b="1" dirty="0">
                 <a:solidFill>

</xml_diff>